<commit_message>
old exam as template
</commit_message>
<xml_diff>
--- a/2022/lectures/1-WhyCryptosystemsFail.pptx
+++ b/2022/lectures/1-WhyCryptosystemsFail.pptx
@@ -227,7 +227,7 @@
           <a:p>
             <a:fld id="{F44A23D4-3D2D-C540-B83F-A1A151C575CB}" type="datetimeFigureOut">
               <a:rPr lang="en-US" smtClean="0"/>
-              <a:t>1/10/22</a:t>
+              <a:t>1/12/22</a:t>
             </a:fld>
             <a:endParaRPr lang="en-US"/>
           </a:p>
@@ -1463,7 +1463,7 @@
           <a:p>
             <a:fld id="{73517929-4004-2A4B-A9B9-6C42BFAE4953}" type="datetimeFigureOut">
               <a:rPr lang="en-US" smtClean="0"/>
-              <a:t>1/10/22</a:t>
+              <a:t>1/12/22</a:t>
             </a:fld>
             <a:endParaRPr lang="en-US"/>
           </a:p>
@@ -1631,7 +1631,7 @@
           <a:p>
             <a:fld id="{73517929-4004-2A4B-A9B9-6C42BFAE4953}" type="datetimeFigureOut">
               <a:rPr lang="en-US" smtClean="0"/>
-              <a:t>1/10/22</a:t>
+              <a:t>1/12/22</a:t>
             </a:fld>
             <a:endParaRPr lang="en-US"/>
           </a:p>
@@ -1809,7 +1809,7 @@
           <a:p>
             <a:fld id="{73517929-4004-2A4B-A9B9-6C42BFAE4953}" type="datetimeFigureOut">
               <a:rPr lang="en-US" smtClean="0"/>
-              <a:t>1/10/22</a:t>
+              <a:t>1/12/22</a:t>
             </a:fld>
             <a:endParaRPr lang="en-US"/>
           </a:p>
@@ -1977,7 +1977,7 @@
           <a:p>
             <a:fld id="{73517929-4004-2A4B-A9B9-6C42BFAE4953}" type="datetimeFigureOut">
               <a:rPr lang="en-US" smtClean="0"/>
-              <a:t>1/10/22</a:t>
+              <a:t>1/12/22</a:t>
             </a:fld>
             <a:endParaRPr lang="en-US"/>
           </a:p>
@@ -2222,7 +2222,7 @@
           <a:p>
             <a:fld id="{73517929-4004-2A4B-A9B9-6C42BFAE4953}" type="datetimeFigureOut">
               <a:rPr lang="en-US" smtClean="0"/>
-              <a:t>1/10/22</a:t>
+              <a:t>1/12/22</a:t>
             </a:fld>
             <a:endParaRPr lang="en-US"/>
           </a:p>
@@ -2507,7 +2507,7 @@
           <a:p>
             <a:fld id="{73517929-4004-2A4B-A9B9-6C42BFAE4953}" type="datetimeFigureOut">
               <a:rPr lang="en-US" smtClean="0"/>
-              <a:t>1/10/22</a:t>
+              <a:t>1/12/22</a:t>
             </a:fld>
             <a:endParaRPr lang="en-US"/>
           </a:p>
@@ -2926,7 +2926,7 @@
           <a:p>
             <a:fld id="{73517929-4004-2A4B-A9B9-6C42BFAE4953}" type="datetimeFigureOut">
               <a:rPr lang="en-US" smtClean="0"/>
-              <a:t>1/10/22</a:t>
+              <a:t>1/12/22</a:t>
             </a:fld>
             <a:endParaRPr lang="en-US"/>
           </a:p>
@@ -3043,7 +3043,7 @@
           <a:p>
             <a:fld id="{73517929-4004-2A4B-A9B9-6C42BFAE4953}" type="datetimeFigureOut">
               <a:rPr lang="en-US" smtClean="0"/>
-              <a:t>1/10/22</a:t>
+              <a:t>1/12/22</a:t>
             </a:fld>
             <a:endParaRPr lang="en-US"/>
           </a:p>
@@ -3138,7 +3138,7 @@
           <a:p>
             <a:fld id="{73517929-4004-2A4B-A9B9-6C42BFAE4953}" type="datetimeFigureOut">
               <a:rPr lang="en-US" smtClean="0"/>
-              <a:t>1/10/22</a:t>
+              <a:t>1/12/22</a:t>
             </a:fld>
             <a:endParaRPr lang="en-US"/>
           </a:p>
@@ -3413,7 +3413,7 @@
           <a:p>
             <a:fld id="{73517929-4004-2A4B-A9B9-6C42BFAE4953}" type="datetimeFigureOut">
               <a:rPr lang="en-US" smtClean="0"/>
-              <a:t>1/10/22</a:t>
+              <a:t>1/12/22</a:t>
             </a:fld>
             <a:endParaRPr lang="en-US"/>
           </a:p>
@@ -3665,7 +3665,7 @@
           <a:p>
             <a:fld id="{73517929-4004-2A4B-A9B9-6C42BFAE4953}" type="datetimeFigureOut">
               <a:rPr lang="en-US" smtClean="0"/>
-              <a:t>1/10/22</a:t>
+              <a:t>1/12/22</a:t>
             </a:fld>
             <a:endParaRPr lang="en-US"/>
           </a:p>
@@ -3876,7 +3876,7 @@
           <a:p>
             <a:fld id="{73517929-4004-2A4B-A9B9-6C42BFAE4953}" type="datetimeFigureOut">
               <a:rPr lang="en-US" smtClean="0"/>
-              <a:t>1/10/22</a:t>
+              <a:t>1/12/22</a:t>
             </a:fld>
             <a:endParaRPr lang="en-US"/>
           </a:p>

</xml_diff>